<commit_message>
updating read.me and flowcharts
</commit_message>
<xml_diff>
--- a/case_study_sims/Figures/read_me_flowchart.pptx
+++ b/case_study_sims/Figures/read_me_flowchart.pptx
@@ -6,7 +6,8 @@
   </p:sldMasterIdLst>
   <p:sldIdLst>
     <p:sldId id="256" r:id="rId2"/>
-    <p:sldId id="257" r:id="rId3"/>
+    <p:sldId id="258" r:id="rId3"/>
+    <p:sldId id="257" r:id="rId4"/>
   </p:sldIdLst>
   <p:sldSz cx="12192000" cy="6858000"/>
   <p:notesSz cx="6858000" cy="9144000"/>
@@ -105,6 +106,11 @@
       </a:defRPr>
     </a:lvl9pPr>
   </p:defaultTextStyle>
+  <p:extLst>
+    <p:ext uri="{EFAFB233-063F-42B5-8137-9DF3F51BA10A}">
+      <p15:sldGuideLst xmlns:p15="http://schemas.microsoft.com/office/powerpoint/2012/main"/>
+    </p:ext>
+  </p:extLst>
 </p:presentation>
 </file>
 
@@ -255,7 +261,7 @@
           <a:p>
             <a:fld id="{94BC5555-0BB8-4130-A190-B8D0F6658C82}" type="datetimeFigureOut">
               <a:rPr lang="en-US" smtClean="0"/>
-              <a:t>11/4/2020</a:t>
+              <a:t>1/5/2021</a:t>
             </a:fld>
             <a:endParaRPr lang="en-US"/>
           </a:p>
@@ -453,7 +459,7 @@
           <a:p>
             <a:fld id="{94BC5555-0BB8-4130-A190-B8D0F6658C82}" type="datetimeFigureOut">
               <a:rPr lang="en-US" smtClean="0"/>
-              <a:t>11/4/2020</a:t>
+              <a:t>1/5/2021</a:t>
             </a:fld>
             <a:endParaRPr lang="en-US"/>
           </a:p>
@@ -661,7 +667,7 @@
           <a:p>
             <a:fld id="{94BC5555-0BB8-4130-A190-B8D0F6658C82}" type="datetimeFigureOut">
               <a:rPr lang="en-US" smtClean="0"/>
-              <a:t>11/4/2020</a:t>
+              <a:t>1/5/2021</a:t>
             </a:fld>
             <a:endParaRPr lang="en-US"/>
           </a:p>
@@ -859,7 +865,7 @@
           <a:p>
             <a:fld id="{94BC5555-0BB8-4130-A190-B8D0F6658C82}" type="datetimeFigureOut">
               <a:rPr lang="en-US" smtClean="0"/>
-              <a:t>11/4/2020</a:t>
+              <a:t>1/5/2021</a:t>
             </a:fld>
             <a:endParaRPr lang="en-US"/>
           </a:p>
@@ -1134,7 +1140,7 @@
           <a:p>
             <a:fld id="{94BC5555-0BB8-4130-A190-B8D0F6658C82}" type="datetimeFigureOut">
               <a:rPr lang="en-US" smtClean="0"/>
-              <a:t>11/4/2020</a:t>
+              <a:t>1/5/2021</a:t>
             </a:fld>
             <a:endParaRPr lang="en-US"/>
           </a:p>
@@ -1399,7 +1405,7 @@
           <a:p>
             <a:fld id="{94BC5555-0BB8-4130-A190-B8D0F6658C82}" type="datetimeFigureOut">
               <a:rPr lang="en-US" smtClean="0"/>
-              <a:t>11/4/2020</a:t>
+              <a:t>1/5/2021</a:t>
             </a:fld>
             <a:endParaRPr lang="en-US"/>
           </a:p>
@@ -1811,7 +1817,7 @@
           <a:p>
             <a:fld id="{94BC5555-0BB8-4130-A190-B8D0F6658C82}" type="datetimeFigureOut">
               <a:rPr lang="en-US" smtClean="0"/>
-              <a:t>11/4/2020</a:t>
+              <a:t>1/5/2021</a:t>
             </a:fld>
             <a:endParaRPr lang="en-US"/>
           </a:p>
@@ -1952,7 +1958,7 @@
           <a:p>
             <a:fld id="{94BC5555-0BB8-4130-A190-B8D0F6658C82}" type="datetimeFigureOut">
               <a:rPr lang="en-US" smtClean="0"/>
-              <a:t>11/4/2020</a:t>
+              <a:t>1/5/2021</a:t>
             </a:fld>
             <a:endParaRPr lang="en-US"/>
           </a:p>
@@ -2065,7 +2071,7 @@
           <a:p>
             <a:fld id="{94BC5555-0BB8-4130-A190-B8D0F6658C82}" type="datetimeFigureOut">
               <a:rPr lang="en-US" smtClean="0"/>
-              <a:t>11/4/2020</a:t>
+              <a:t>1/5/2021</a:t>
             </a:fld>
             <a:endParaRPr lang="en-US"/>
           </a:p>
@@ -2376,7 +2382,7 @@
           <a:p>
             <a:fld id="{94BC5555-0BB8-4130-A190-B8D0F6658C82}" type="datetimeFigureOut">
               <a:rPr lang="en-US" smtClean="0"/>
-              <a:t>11/4/2020</a:t>
+              <a:t>1/5/2021</a:t>
             </a:fld>
             <a:endParaRPr lang="en-US"/>
           </a:p>
@@ -2664,7 +2670,7 @@
           <a:p>
             <a:fld id="{94BC5555-0BB8-4130-A190-B8D0F6658C82}" type="datetimeFigureOut">
               <a:rPr lang="en-US" smtClean="0"/>
-              <a:t>11/4/2020</a:t>
+              <a:t>1/5/2021</a:t>
             </a:fld>
             <a:endParaRPr lang="en-US"/>
           </a:p>
@@ -2905,7 +2911,7 @@
           <a:p>
             <a:fld id="{94BC5555-0BB8-4130-A190-B8D0F6658C82}" type="datetimeFigureOut">
               <a:rPr lang="en-US" smtClean="0"/>
-              <a:t>11/4/2020</a:t>
+              <a:t>1/5/2021</a:t>
             </a:fld>
             <a:endParaRPr lang="en-US"/>
           </a:p>
@@ -3336,7 +3342,455 @@
         </p:nvSpPr>
         <p:spPr>
           <a:xfrm>
-            <a:off x="1073790" y="1719743"/>
+            <a:off x="402672" y="2691118"/>
+            <a:ext cx="2332139" cy="1216404"/>
+          </a:xfrm>
+          <a:prstGeom prst="rect">
+            <a:avLst/>
+          </a:prstGeom>
+          <a:solidFill>
+            <a:schemeClr val="bg1">
+              <a:lumMod val="95000"/>
+            </a:schemeClr>
+          </a:solidFill>
+          <a:ln>
+            <a:solidFill>
+              <a:schemeClr val="tx1"/>
+            </a:solidFill>
+          </a:ln>
+        </p:spPr>
+        <p:style>
+          <a:lnRef idx="2">
+            <a:schemeClr val="accent1">
+              <a:shade val="50000"/>
+            </a:schemeClr>
+          </a:lnRef>
+          <a:fillRef idx="1">
+            <a:schemeClr val="accent1"/>
+          </a:fillRef>
+          <a:effectRef idx="0">
+            <a:schemeClr val="accent1"/>
+          </a:effectRef>
+          <a:fontRef idx="minor">
+            <a:schemeClr val="lt1"/>
+          </a:fontRef>
+        </p:style>
+        <p:txBody>
+          <a:bodyPr rtlCol="0" anchor="ctr"/>
+          <a:lstStyle/>
+          <a:p>
+            <a:r>
+              <a:rPr lang="en-US" sz="1600" dirty="0">
+                <a:solidFill>
+                  <a:schemeClr val="tx1"/>
+                </a:solidFill>
+              </a:rPr>
+              <a:t>1) Create parameter files (.par) for simulation using text editor and specific Simcoal2 formatting</a:t>
+            </a:r>
+          </a:p>
+        </p:txBody>
+      </p:sp>
+      <p:sp>
+        <p:nvSpPr>
+          <p:cNvPr id="5" name="Rectangle 4">
+            <a:extLst>
+              <a:ext uri="{FF2B5EF4-FFF2-40B4-BE49-F238E27FC236}">
+                <a16:creationId xmlns:a16="http://schemas.microsoft.com/office/drawing/2014/main" id="{3BA1E4A8-B105-493A-8802-2299747F9CC6}"/>
+              </a:ext>
+            </a:extLst>
+          </p:cNvPr>
+          <p:cNvSpPr/>
+          <p:nvPr/>
+        </p:nvSpPr>
+        <p:spPr>
+          <a:xfrm>
+            <a:off x="3440887" y="2691118"/>
+            <a:ext cx="2332139" cy="1216404"/>
+          </a:xfrm>
+          <a:prstGeom prst="rect">
+            <a:avLst/>
+          </a:prstGeom>
+          <a:solidFill>
+            <a:schemeClr val="bg1">
+              <a:lumMod val="95000"/>
+            </a:schemeClr>
+          </a:solidFill>
+          <a:ln>
+            <a:solidFill>
+              <a:schemeClr val="tx1"/>
+            </a:solidFill>
+          </a:ln>
+        </p:spPr>
+        <p:style>
+          <a:lnRef idx="2">
+            <a:schemeClr val="accent1">
+              <a:shade val="50000"/>
+            </a:schemeClr>
+          </a:lnRef>
+          <a:fillRef idx="1">
+            <a:schemeClr val="accent1"/>
+          </a:fillRef>
+          <a:effectRef idx="0">
+            <a:schemeClr val="accent1"/>
+          </a:effectRef>
+          <a:fontRef idx="minor">
+            <a:schemeClr val="lt1"/>
+          </a:fontRef>
+        </p:style>
+        <p:txBody>
+          <a:bodyPr rtlCol="0" anchor="ctr"/>
+          <a:lstStyle/>
+          <a:p>
+            <a:r>
+              <a:rPr lang="en-US" sz="1600" dirty="0">
+                <a:solidFill>
+                  <a:schemeClr val="tx1"/>
+                </a:solidFill>
+              </a:rPr>
+              <a:t>2) Use parameter files to run simulations on software Simcoal2.1.2</a:t>
+            </a:r>
+          </a:p>
+        </p:txBody>
+      </p:sp>
+      <p:sp>
+        <p:nvSpPr>
+          <p:cNvPr id="6" name="Rectangle 5">
+            <a:extLst>
+              <a:ext uri="{FF2B5EF4-FFF2-40B4-BE49-F238E27FC236}">
+                <a16:creationId xmlns:a16="http://schemas.microsoft.com/office/drawing/2014/main" id="{C409E665-444E-4743-832F-82FE7EB2B216}"/>
+              </a:ext>
+            </a:extLst>
+          </p:cNvPr>
+          <p:cNvSpPr/>
+          <p:nvPr/>
+        </p:nvSpPr>
+        <p:spPr>
+          <a:xfrm>
+            <a:off x="6420374" y="2691117"/>
+            <a:ext cx="2332139" cy="1216405"/>
+          </a:xfrm>
+          <a:prstGeom prst="rect">
+            <a:avLst/>
+          </a:prstGeom>
+          <a:solidFill>
+            <a:schemeClr val="bg1">
+              <a:lumMod val="95000"/>
+            </a:schemeClr>
+          </a:solidFill>
+          <a:ln>
+            <a:solidFill>
+              <a:schemeClr val="tx1"/>
+            </a:solidFill>
+          </a:ln>
+        </p:spPr>
+        <p:style>
+          <a:lnRef idx="2">
+            <a:schemeClr val="accent1">
+              <a:shade val="50000"/>
+            </a:schemeClr>
+          </a:lnRef>
+          <a:fillRef idx="1">
+            <a:schemeClr val="accent1"/>
+          </a:fillRef>
+          <a:effectRef idx="0">
+            <a:schemeClr val="accent1"/>
+          </a:effectRef>
+          <a:fontRef idx="minor">
+            <a:schemeClr val="lt1"/>
+          </a:fontRef>
+        </p:style>
+        <p:txBody>
+          <a:bodyPr rtlCol="0" anchor="ctr"/>
+          <a:lstStyle/>
+          <a:p>
+            <a:r>
+              <a:rPr lang="en-US" sz="1600" dirty="0">
+                <a:solidFill>
+                  <a:schemeClr val="tx1"/>
+                </a:solidFill>
+              </a:rPr>
+              <a:t> 3) Simulation writes Arlequin format files (.</a:t>
+            </a:r>
+            <a:r>
+              <a:rPr lang="en-US" sz="1600" dirty="0" err="1">
+                <a:solidFill>
+                  <a:schemeClr val="tx1"/>
+                </a:solidFill>
+              </a:rPr>
+              <a:t>arp</a:t>
+            </a:r>
+            <a:r>
+              <a:rPr lang="en-US" sz="1600" dirty="0">
+                <a:solidFill>
+                  <a:schemeClr val="tx1"/>
+                </a:solidFill>
+              </a:rPr>
+              <a:t>) and saves in folders</a:t>
+            </a:r>
+          </a:p>
+        </p:txBody>
+      </p:sp>
+      <p:sp>
+        <p:nvSpPr>
+          <p:cNvPr id="9" name="Rectangle 8">
+            <a:extLst>
+              <a:ext uri="{FF2B5EF4-FFF2-40B4-BE49-F238E27FC236}">
+                <a16:creationId xmlns:a16="http://schemas.microsoft.com/office/drawing/2014/main" id="{E480B252-AF24-4616-BA6D-944C2AD567D0}"/>
+              </a:ext>
+            </a:extLst>
+          </p:cNvPr>
+          <p:cNvSpPr/>
+          <p:nvPr/>
+        </p:nvSpPr>
+        <p:spPr>
+          <a:xfrm>
+            <a:off x="9458589" y="2699856"/>
+            <a:ext cx="2332139" cy="1216406"/>
+          </a:xfrm>
+          <a:prstGeom prst="rect">
+            <a:avLst/>
+          </a:prstGeom>
+          <a:solidFill>
+            <a:schemeClr val="bg1">
+              <a:lumMod val="95000"/>
+            </a:schemeClr>
+          </a:solidFill>
+          <a:ln>
+            <a:solidFill>
+              <a:schemeClr val="tx1"/>
+            </a:solidFill>
+          </a:ln>
+        </p:spPr>
+        <p:style>
+          <a:lnRef idx="2">
+            <a:schemeClr val="accent1">
+              <a:shade val="50000"/>
+            </a:schemeClr>
+          </a:lnRef>
+          <a:fillRef idx="1">
+            <a:schemeClr val="accent1"/>
+          </a:fillRef>
+          <a:effectRef idx="0">
+            <a:schemeClr val="accent1"/>
+          </a:effectRef>
+          <a:fontRef idx="minor">
+            <a:schemeClr val="lt1"/>
+          </a:fontRef>
+        </p:style>
+        <p:txBody>
+          <a:bodyPr rtlCol="0" anchor="ctr"/>
+          <a:lstStyle/>
+          <a:p>
+            <a:r>
+              <a:rPr lang="en-US" sz="1600" dirty="0">
+                <a:solidFill>
+                  <a:schemeClr val="tx1"/>
+                </a:solidFill>
+              </a:rPr>
+              <a:t>4)Run R script for each species to import/convert simulation data, save results in </a:t>
+            </a:r>
+            <a:r>
+              <a:rPr lang="en-US" sz="1600" dirty="0" err="1">
+                <a:solidFill>
+                  <a:schemeClr val="tx1"/>
+                </a:solidFill>
+              </a:rPr>
+              <a:t>dataframes</a:t>
+            </a:r>
+            <a:r>
+              <a:rPr lang="en-US" sz="1600" dirty="0">
+                <a:solidFill>
+                  <a:schemeClr val="tx1"/>
+                </a:solidFill>
+              </a:rPr>
+              <a:t>, and plot results</a:t>
+            </a:r>
+          </a:p>
+        </p:txBody>
+      </p:sp>
+      <p:sp>
+        <p:nvSpPr>
+          <p:cNvPr id="10" name="Arrow: Right 9">
+            <a:extLst>
+              <a:ext uri="{FF2B5EF4-FFF2-40B4-BE49-F238E27FC236}">
+                <a16:creationId xmlns:a16="http://schemas.microsoft.com/office/drawing/2014/main" id="{9F4062B7-16E6-402E-B60D-6AB775B799A5}"/>
+              </a:ext>
+            </a:extLst>
+          </p:cNvPr>
+          <p:cNvSpPr/>
+          <p:nvPr/>
+        </p:nvSpPr>
+        <p:spPr>
+          <a:xfrm>
+            <a:off x="2660711" y="3053593"/>
+            <a:ext cx="854276" cy="508932"/>
+          </a:xfrm>
+          <a:prstGeom prst="rightArrow">
+            <a:avLst/>
+          </a:prstGeom>
+        </p:spPr>
+        <p:style>
+          <a:lnRef idx="2">
+            <a:schemeClr val="accent1">
+              <a:shade val="50000"/>
+            </a:schemeClr>
+          </a:lnRef>
+          <a:fillRef idx="1">
+            <a:schemeClr val="accent1"/>
+          </a:fillRef>
+          <a:effectRef idx="0">
+            <a:schemeClr val="accent1"/>
+          </a:effectRef>
+          <a:fontRef idx="minor">
+            <a:schemeClr val="lt1"/>
+          </a:fontRef>
+        </p:style>
+        <p:txBody>
+          <a:bodyPr rtlCol="0" anchor="ctr"/>
+          <a:lstStyle/>
+          <a:p>
+            <a:pPr algn="ctr"/>
+            <a:endParaRPr lang="en-US"/>
+          </a:p>
+        </p:txBody>
+      </p:sp>
+      <p:sp>
+        <p:nvSpPr>
+          <p:cNvPr id="24" name="Arrow: Right 23">
+            <a:extLst>
+              <a:ext uri="{FF2B5EF4-FFF2-40B4-BE49-F238E27FC236}">
+                <a16:creationId xmlns:a16="http://schemas.microsoft.com/office/drawing/2014/main" id="{50D5BAF8-009F-4C88-A96A-5CFDFE0398D8}"/>
+              </a:ext>
+            </a:extLst>
+          </p:cNvPr>
+          <p:cNvSpPr/>
+          <p:nvPr/>
+        </p:nvSpPr>
+        <p:spPr>
+          <a:xfrm>
+            <a:off x="5624826" y="3044854"/>
+            <a:ext cx="854276" cy="508932"/>
+          </a:xfrm>
+          <a:prstGeom prst="rightArrow">
+            <a:avLst/>
+          </a:prstGeom>
+        </p:spPr>
+        <p:style>
+          <a:lnRef idx="2">
+            <a:schemeClr val="accent1">
+              <a:shade val="50000"/>
+            </a:schemeClr>
+          </a:lnRef>
+          <a:fillRef idx="1">
+            <a:schemeClr val="accent1"/>
+          </a:fillRef>
+          <a:effectRef idx="0">
+            <a:schemeClr val="accent1"/>
+          </a:effectRef>
+          <a:fontRef idx="minor">
+            <a:schemeClr val="lt1"/>
+          </a:fontRef>
+        </p:style>
+        <p:txBody>
+          <a:bodyPr rtlCol="0" anchor="ctr"/>
+          <a:lstStyle/>
+          <a:p>
+            <a:pPr algn="ctr"/>
+            <a:endParaRPr lang="en-US"/>
+          </a:p>
+        </p:txBody>
+      </p:sp>
+      <p:sp>
+        <p:nvSpPr>
+          <p:cNvPr id="25" name="Arrow: Right 24">
+            <a:extLst>
+              <a:ext uri="{FF2B5EF4-FFF2-40B4-BE49-F238E27FC236}">
+                <a16:creationId xmlns:a16="http://schemas.microsoft.com/office/drawing/2014/main" id="{12D447D8-884B-4C9B-B5E9-B1942FAE44B7}"/>
+              </a:ext>
+            </a:extLst>
+          </p:cNvPr>
+          <p:cNvSpPr/>
+          <p:nvPr/>
+        </p:nvSpPr>
+        <p:spPr>
+          <a:xfrm>
+            <a:off x="8649759" y="3044504"/>
+            <a:ext cx="854276" cy="508932"/>
+          </a:xfrm>
+          <a:prstGeom prst="rightArrow">
+            <a:avLst/>
+          </a:prstGeom>
+        </p:spPr>
+        <p:style>
+          <a:lnRef idx="2">
+            <a:schemeClr val="accent1">
+              <a:shade val="50000"/>
+            </a:schemeClr>
+          </a:lnRef>
+          <a:fillRef idx="1">
+            <a:schemeClr val="accent1"/>
+          </a:fillRef>
+          <a:effectRef idx="0">
+            <a:schemeClr val="accent1"/>
+          </a:effectRef>
+          <a:fontRef idx="minor">
+            <a:schemeClr val="lt1"/>
+          </a:fontRef>
+        </p:style>
+        <p:txBody>
+          <a:bodyPr rtlCol="0" anchor="ctr"/>
+          <a:lstStyle/>
+          <a:p>
+            <a:pPr algn="ctr"/>
+            <a:endParaRPr lang="en-US"/>
+          </a:p>
+        </p:txBody>
+      </p:sp>
+    </p:spTree>
+    <p:extLst>
+      <p:ext uri="{BB962C8B-B14F-4D97-AF65-F5344CB8AC3E}">
+        <p14:creationId xmlns:p14="http://schemas.microsoft.com/office/powerpoint/2010/main" val="1132971420"/>
+      </p:ext>
+    </p:extLst>
+  </p:cSld>
+  <p:clrMapOvr>
+    <a:masterClrMapping/>
+  </p:clrMapOvr>
+</p:sld>
+</file>
+
+<file path=ppt/slides/slide2.xml><?xml version="1.0" encoding="utf-8"?>
+<p:sld xmlns:a="http://schemas.openxmlformats.org/drawingml/2006/main" xmlns:r="http://schemas.openxmlformats.org/officeDocument/2006/relationships" xmlns:p="http://schemas.openxmlformats.org/presentationml/2006/main">
+  <p:cSld>
+    <p:spTree>
+      <p:nvGrpSpPr>
+        <p:cNvPr id="1" name=""/>
+        <p:cNvGrpSpPr/>
+        <p:nvPr/>
+      </p:nvGrpSpPr>
+      <p:grpSpPr>
+        <a:xfrm>
+          <a:off x="0" y="0"/>
+          <a:ext cx="0" cy="0"/>
+          <a:chOff x="0" y="0"/>
+          <a:chExt cx="0" cy="0"/>
+        </a:xfrm>
+      </p:grpSpPr>
+      <p:sp>
+        <p:nvSpPr>
+          <p:cNvPr id="4" name="Rectangle 3">
+            <a:extLst>
+              <a:ext uri="{FF2B5EF4-FFF2-40B4-BE49-F238E27FC236}">
+                <a16:creationId xmlns:a16="http://schemas.microsoft.com/office/drawing/2014/main" id="{40321EDA-7EDF-4FA1-A05F-287DFB6266EA}"/>
+              </a:ext>
+            </a:extLst>
+          </p:cNvPr>
+          <p:cNvSpPr/>
+          <p:nvPr/>
+        </p:nvSpPr>
+        <p:spPr>
+          <a:xfrm>
+            <a:off x="612397" y="427838"/>
             <a:ext cx="2592199" cy="1468074"/>
           </a:xfrm>
           <a:prstGeom prst="rect">
@@ -3373,14 +3827,13 @@
           <a:bodyPr rtlCol="0" anchor="ctr"/>
           <a:lstStyle/>
           <a:p>
-            <a:pPr algn="ctr"/>
             <a:r>
               <a:rPr lang="en-US" dirty="0">
                 <a:solidFill>
                   <a:schemeClr val="tx1"/>
                 </a:solidFill>
               </a:rPr>
-              <a:t>1) Create parameter files (.par) for simulation using text editor</a:t>
+              <a:t>1) Create species-specific parameter files (.par) for simulation using text editor and realistic values</a:t>
             </a:r>
           </a:p>
         </p:txBody>
@@ -3390,7 +3843,7 @@
           <p:cNvPr id="5" name="Rectangle 4">
             <a:extLst>
               <a:ext uri="{FF2B5EF4-FFF2-40B4-BE49-F238E27FC236}">
-                <a16:creationId xmlns:a16="http://schemas.microsoft.com/office/drawing/2014/main" id="{3BA1E4A8-B105-493A-8802-2299747F9CC6}"/>
+                <a16:creationId xmlns:a16="http://schemas.microsoft.com/office/drawing/2014/main" id="{769644D1-B7BC-41F4-97EC-FA739E4A3FCF}"/>
               </a:ext>
             </a:extLst>
           </p:cNvPr>
@@ -3399,7 +3852,7 @@
         </p:nvSpPr>
         <p:spPr>
           <a:xfrm>
-            <a:off x="4699232" y="1719743"/>
+            <a:off x="4451060" y="427838"/>
             <a:ext cx="2592199" cy="1468074"/>
           </a:xfrm>
           <a:prstGeom prst="rect">
@@ -3436,14 +3889,29 @@
           <a:bodyPr rtlCol="0" anchor="ctr"/>
           <a:lstStyle/>
           <a:p>
-            <a:pPr algn="ctr"/>
             <a:r>
               <a:rPr lang="en-US" dirty="0">
                 <a:solidFill>
                   <a:schemeClr val="tx1"/>
                 </a:solidFill>
               </a:rPr>
-              <a:t>2) Use parameter files to run simulations on Simcoal 2.1.2</a:t>
+              <a:t>2) Use parameter files to run simulations on </a:t>
+            </a:r>
+            <a:r>
+              <a:rPr lang="en-US" dirty="0" err="1">
+                <a:solidFill>
+                  <a:schemeClr val="tx1"/>
+                </a:solidFill>
+              </a:rPr>
+              <a:t>Simcoal</a:t>
+            </a:r>
+            <a:r>
+              <a:rPr lang="en-US" dirty="0">
+                <a:solidFill>
+                  <a:schemeClr val="tx1"/>
+                </a:solidFill>
+              </a:rPr>
+              <a:t> 2.1.2 for each species</a:t>
             </a:r>
           </a:p>
         </p:txBody>
@@ -3453,7 +3921,7 @@
           <p:cNvPr id="6" name="Rectangle 5">
             <a:extLst>
               <a:ext uri="{FF2B5EF4-FFF2-40B4-BE49-F238E27FC236}">
-                <a16:creationId xmlns:a16="http://schemas.microsoft.com/office/drawing/2014/main" id="{C409E665-444E-4743-832F-82FE7EB2B216}"/>
+                <a16:creationId xmlns:a16="http://schemas.microsoft.com/office/drawing/2014/main" id="{53913207-B9EC-46A5-AB13-C8D369140E85}"/>
               </a:ext>
             </a:extLst>
           </p:cNvPr>
@@ -3462,7 +3930,7 @@
         </p:nvSpPr>
         <p:spPr>
           <a:xfrm>
-            <a:off x="8391786" y="1719743"/>
+            <a:off x="8207230" y="427838"/>
             <a:ext cx="2592199" cy="1468074"/>
           </a:xfrm>
           <a:prstGeom prst="rect">
@@ -3499,87 +3967,39 @@
           <a:bodyPr rtlCol="0" anchor="ctr"/>
           <a:lstStyle/>
           <a:p>
-            <a:pPr algn="ctr"/>
             <a:r>
               <a:rPr lang="en-US" dirty="0">
                 <a:solidFill>
                   <a:schemeClr val="tx1"/>
                 </a:solidFill>
               </a:rPr>
-              <a:t> 3) Simulation writes Arlequin format files (.arp)</a:t>
-            </a:r>
-          </a:p>
-        </p:txBody>
-      </p:sp>
-      <p:sp>
-        <p:nvSpPr>
-          <p:cNvPr id="7" name="Rectangle 6">
-            <a:extLst>
-              <a:ext uri="{FF2B5EF4-FFF2-40B4-BE49-F238E27FC236}">
-                <a16:creationId xmlns:a16="http://schemas.microsoft.com/office/drawing/2014/main" id="{2C85EE67-2BDB-41BA-9938-936B18B60511}"/>
-              </a:ext>
-            </a:extLst>
-          </p:cNvPr>
-          <p:cNvSpPr/>
-          <p:nvPr/>
-        </p:nvSpPr>
-        <p:spPr>
-          <a:xfrm>
-            <a:off x="8391786" y="4237839"/>
-            <a:ext cx="2592199" cy="1468074"/>
-          </a:xfrm>
-          <a:prstGeom prst="rect">
-            <a:avLst/>
-          </a:prstGeom>
-          <a:solidFill>
-            <a:schemeClr val="bg1">
-              <a:lumMod val="95000"/>
-            </a:schemeClr>
-          </a:solidFill>
-          <a:ln>
-            <a:solidFill>
-              <a:schemeClr val="tx1"/>
-            </a:solidFill>
-          </a:ln>
-        </p:spPr>
-        <p:style>
-          <a:lnRef idx="2">
-            <a:schemeClr val="accent1">
-              <a:shade val="50000"/>
-            </a:schemeClr>
-          </a:lnRef>
-          <a:fillRef idx="1">
-            <a:schemeClr val="accent1"/>
-          </a:fillRef>
-          <a:effectRef idx="0">
-            <a:schemeClr val="accent1"/>
-          </a:effectRef>
-          <a:fontRef idx="minor">
-            <a:schemeClr val="lt1"/>
-          </a:fontRef>
-        </p:style>
-        <p:txBody>
-          <a:bodyPr rtlCol="0" anchor="ctr"/>
-          <a:lstStyle/>
-          <a:p>
-            <a:pPr algn="ctr"/>
+              <a:t> 3) Simulation writes Arlequin format files (.</a:t>
+            </a:r>
+            <a:r>
+              <a:rPr lang="en-US" dirty="0" err="1">
+                <a:solidFill>
+                  <a:schemeClr val="tx1"/>
+                </a:solidFill>
+              </a:rPr>
+              <a:t>arp</a:t>
+            </a:r>
             <a:r>
               <a:rPr lang="en-US" dirty="0">
                 <a:solidFill>
                   <a:schemeClr val="tx1"/>
                 </a:solidFill>
               </a:rPr>
-              <a:t>4) Convert Arlequin format to Genepop format files (.gen) using R functions</a:t>
-            </a:r>
-          </a:p>
-        </p:txBody>
-      </p:sp>
-      <p:sp>
-        <p:nvSpPr>
-          <p:cNvPr id="8" name="Rectangle 7">
-            <a:extLst>
-              <a:ext uri="{FF2B5EF4-FFF2-40B4-BE49-F238E27FC236}">
-                <a16:creationId xmlns:a16="http://schemas.microsoft.com/office/drawing/2014/main" id="{54F6F391-DBBE-4620-B8D3-8E1BBBB4C55A}"/>
+              <a:t>) and saves in folders</a:t>
+            </a:r>
+          </a:p>
+        </p:txBody>
+      </p:sp>
+      <p:sp>
+        <p:nvSpPr>
+          <p:cNvPr id="7" name="Arrow: Right 6">
+            <a:extLst>
+              <a:ext uri="{FF2B5EF4-FFF2-40B4-BE49-F238E27FC236}">
+                <a16:creationId xmlns:a16="http://schemas.microsoft.com/office/drawing/2014/main" id="{7946799D-6910-414A-A924-A19AB11EBCFD}"/>
               </a:ext>
             </a:extLst>
           </p:cNvPr>
@@ -3588,133 +4008,7 @@
         </p:nvSpPr>
         <p:spPr>
           <a:xfrm>
-            <a:off x="4699232" y="4237839"/>
-            <a:ext cx="2592199" cy="1468074"/>
-          </a:xfrm>
-          <a:prstGeom prst="rect">
-            <a:avLst/>
-          </a:prstGeom>
-          <a:solidFill>
-            <a:schemeClr val="bg1">
-              <a:lumMod val="95000"/>
-            </a:schemeClr>
-          </a:solidFill>
-          <a:ln>
-            <a:solidFill>
-              <a:schemeClr val="tx1"/>
-            </a:solidFill>
-          </a:ln>
-        </p:spPr>
-        <p:style>
-          <a:lnRef idx="2">
-            <a:schemeClr val="accent1">
-              <a:shade val="50000"/>
-            </a:schemeClr>
-          </a:lnRef>
-          <a:fillRef idx="1">
-            <a:schemeClr val="accent1"/>
-          </a:fillRef>
-          <a:effectRef idx="0">
-            <a:schemeClr val="accent1"/>
-          </a:effectRef>
-          <a:fontRef idx="minor">
-            <a:schemeClr val="lt1"/>
-          </a:fontRef>
-        </p:style>
-        <p:txBody>
-          <a:bodyPr rtlCol="0" anchor="ctr"/>
-          <a:lstStyle/>
-          <a:p>
-            <a:pPr algn="ctr"/>
-            <a:r>
-              <a:rPr lang="en-US" dirty="0">
-                <a:solidFill>
-                  <a:schemeClr val="tx1"/>
-                </a:solidFill>
-              </a:rPr>
-              <a:t>5) Convert Genepop format to Genind objects in R using Adegenet package</a:t>
-            </a:r>
-          </a:p>
-        </p:txBody>
-      </p:sp>
-      <p:sp>
-        <p:nvSpPr>
-          <p:cNvPr id="9" name="Rectangle 8">
-            <a:extLst>
-              <a:ext uri="{FF2B5EF4-FFF2-40B4-BE49-F238E27FC236}">
-                <a16:creationId xmlns:a16="http://schemas.microsoft.com/office/drawing/2014/main" id="{E480B252-AF24-4616-BA6D-944C2AD567D0}"/>
-              </a:ext>
-            </a:extLst>
-          </p:cNvPr>
-          <p:cNvSpPr/>
-          <p:nvPr/>
-        </p:nvSpPr>
-        <p:spPr>
-          <a:xfrm>
-            <a:off x="1073790" y="4237839"/>
-            <a:ext cx="2592199" cy="1468074"/>
-          </a:xfrm>
-          <a:prstGeom prst="rect">
-            <a:avLst/>
-          </a:prstGeom>
-          <a:solidFill>
-            <a:schemeClr val="bg1">
-              <a:lumMod val="95000"/>
-            </a:schemeClr>
-          </a:solidFill>
-          <a:ln>
-            <a:solidFill>
-              <a:schemeClr val="tx1"/>
-            </a:solidFill>
-          </a:ln>
-        </p:spPr>
-        <p:style>
-          <a:lnRef idx="2">
-            <a:schemeClr val="accent1">
-              <a:shade val="50000"/>
-            </a:schemeClr>
-          </a:lnRef>
-          <a:fillRef idx="1">
-            <a:schemeClr val="accent1"/>
-          </a:fillRef>
-          <a:effectRef idx="0">
-            <a:schemeClr val="accent1"/>
-          </a:effectRef>
-          <a:fontRef idx="minor">
-            <a:schemeClr val="lt1"/>
-          </a:fontRef>
-        </p:style>
-        <p:txBody>
-          <a:bodyPr rtlCol="0" anchor="ctr"/>
-          <a:lstStyle/>
-          <a:p>
-            <a:pPr algn="ctr"/>
-            <a:r>
-              <a:rPr lang="en-US" dirty="0">
-                <a:solidFill>
-                  <a:schemeClr val="tx1"/>
-                </a:solidFill>
-              </a:rPr>
-              <a:t>6)Run analyses in R using Genind objects</a:t>
-            </a:r>
-          </a:p>
-        </p:txBody>
-      </p:sp>
-      <p:sp>
-        <p:nvSpPr>
-          <p:cNvPr id="10" name="Arrow: Right 9">
-            <a:extLst>
-              <a:ext uri="{FF2B5EF4-FFF2-40B4-BE49-F238E27FC236}">
-                <a16:creationId xmlns:a16="http://schemas.microsoft.com/office/drawing/2014/main" id="{9F4062B7-16E6-402E-B60D-6AB775B799A5}"/>
-              </a:ext>
-            </a:extLst>
-          </p:cNvPr>
-          <p:cNvSpPr/>
-          <p:nvPr/>
-        </p:nvSpPr>
-        <p:spPr>
-          <a:xfrm>
-            <a:off x="3758268" y="2132901"/>
+            <a:off x="3296875" y="840996"/>
             <a:ext cx="1159078" cy="641758"/>
           </a:xfrm>
           <a:prstGeom prst="rightArrow">
@@ -3748,10 +4042,10 @@
       </p:sp>
       <p:sp>
         <p:nvSpPr>
-          <p:cNvPr id="11" name="Arrow: Right 10">
-            <a:extLst>
-              <a:ext uri="{FF2B5EF4-FFF2-40B4-BE49-F238E27FC236}">
-                <a16:creationId xmlns:a16="http://schemas.microsoft.com/office/drawing/2014/main" id="{C36E56C8-3C92-4835-A5A6-D002FA455884}"/>
+          <p:cNvPr id="8" name="Arrow: Right 7">
+            <a:extLst>
+              <a:ext uri="{FF2B5EF4-FFF2-40B4-BE49-F238E27FC236}">
+                <a16:creationId xmlns:a16="http://schemas.microsoft.com/office/drawing/2014/main" id="{AB965D41-FAB8-4069-B9A1-412C165E5761}"/>
               </a:ext>
             </a:extLst>
           </p:cNvPr>
@@ -3760,7 +4054,7 @@
         </p:nvSpPr>
         <p:spPr>
           <a:xfrm>
-            <a:off x="7400488" y="2132901"/>
+            <a:off x="7048152" y="840996"/>
             <a:ext cx="1159078" cy="641758"/>
           </a:xfrm>
           <a:prstGeom prst="rightArrow">
@@ -3794,10 +4088,10 @@
       </p:sp>
       <p:sp>
         <p:nvSpPr>
-          <p:cNvPr id="12" name="Arrow: Right 11">
-            <a:extLst>
-              <a:ext uri="{FF2B5EF4-FFF2-40B4-BE49-F238E27FC236}">
-                <a16:creationId xmlns:a16="http://schemas.microsoft.com/office/drawing/2014/main" id="{5799B8AC-C9EF-4888-91F4-E1CC74CE9E50}"/>
+          <p:cNvPr id="9" name="Arrow: Right 8">
+            <a:extLst>
+              <a:ext uri="{FF2B5EF4-FFF2-40B4-BE49-F238E27FC236}">
+                <a16:creationId xmlns:a16="http://schemas.microsoft.com/office/drawing/2014/main" id="{E3BCEDD5-6ED1-4B16-A9C3-52592572674A}"/>
               </a:ext>
             </a:extLst>
           </p:cNvPr>
@@ -3806,7 +4100,7 @@
         </p:nvSpPr>
         <p:spPr>
           <a:xfrm rot="5400000">
-            <a:off x="9108346" y="3524776"/>
+            <a:off x="8923790" y="1986093"/>
             <a:ext cx="1159078" cy="641758"/>
           </a:xfrm>
           <a:prstGeom prst="rightArrow">
@@ -3838,137 +4132,10 @@
           </a:p>
         </p:txBody>
       </p:sp>
-      <p:sp>
-        <p:nvSpPr>
-          <p:cNvPr id="13" name="Arrow: Right 12">
-            <a:extLst>
-              <a:ext uri="{FF2B5EF4-FFF2-40B4-BE49-F238E27FC236}">
-                <a16:creationId xmlns:a16="http://schemas.microsoft.com/office/drawing/2014/main" id="{49D65262-A5D1-4ED3-9B3E-D1B4ACFD1928}"/>
-              </a:ext>
-            </a:extLst>
-          </p:cNvPr>
-          <p:cNvSpPr/>
-          <p:nvPr/>
-        </p:nvSpPr>
-        <p:spPr>
-          <a:xfrm rot="10800000">
-            <a:off x="7165596" y="4650997"/>
-            <a:ext cx="1159078" cy="641758"/>
-          </a:xfrm>
-          <a:prstGeom prst="rightArrow">
-            <a:avLst/>
-          </a:prstGeom>
-        </p:spPr>
-        <p:style>
-          <a:lnRef idx="2">
-            <a:schemeClr val="accent1">
-              <a:shade val="50000"/>
-            </a:schemeClr>
-          </a:lnRef>
-          <a:fillRef idx="1">
-            <a:schemeClr val="accent1"/>
-          </a:fillRef>
-          <a:effectRef idx="0">
-            <a:schemeClr val="accent1"/>
-          </a:effectRef>
-          <a:fontRef idx="minor">
-            <a:schemeClr val="lt1"/>
-          </a:fontRef>
-        </p:style>
-        <p:txBody>
-          <a:bodyPr rtlCol="0" anchor="ctr"/>
-          <a:lstStyle/>
-          <a:p>
-            <a:pPr algn="ctr"/>
-            <a:endParaRPr lang="en-US"/>
-          </a:p>
-        </p:txBody>
-      </p:sp>
-      <p:sp>
-        <p:nvSpPr>
-          <p:cNvPr id="14" name="Arrow: Right 13">
-            <a:extLst>
-              <a:ext uri="{FF2B5EF4-FFF2-40B4-BE49-F238E27FC236}">
-                <a16:creationId xmlns:a16="http://schemas.microsoft.com/office/drawing/2014/main" id="{96D8E3E4-F8FE-4EC8-A987-B01FCFC5F948}"/>
-              </a:ext>
-            </a:extLst>
-          </p:cNvPr>
-          <p:cNvSpPr/>
-          <p:nvPr/>
-        </p:nvSpPr>
-        <p:spPr>
-          <a:xfrm rot="10800000">
-            <a:off x="3473042" y="4673369"/>
-            <a:ext cx="1159078" cy="641758"/>
-          </a:xfrm>
-          <a:prstGeom prst="rightArrow">
-            <a:avLst/>
-          </a:prstGeom>
-        </p:spPr>
-        <p:style>
-          <a:lnRef idx="2">
-            <a:schemeClr val="accent1">
-              <a:shade val="50000"/>
-            </a:schemeClr>
-          </a:lnRef>
-          <a:fillRef idx="1">
-            <a:schemeClr val="accent1"/>
-          </a:fillRef>
-          <a:effectRef idx="0">
-            <a:schemeClr val="accent1"/>
-          </a:effectRef>
-          <a:fontRef idx="minor">
-            <a:schemeClr val="lt1"/>
-          </a:fontRef>
-        </p:style>
-        <p:txBody>
-          <a:bodyPr rtlCol="0" anchor="ctr"/>
-          <a:lstStyle/>
-          <a:p>
-            <a:pPr algn="ctr"/>
-            <a:endParaRPr lang="en-US"/>
-          </a:p>
-        </p:txBody>
-      </p:sp>
-      <p:sp>
-        <p:nvSpPr>
-          <p:cNvPr id="15" name="TextBox 14">
-            <a:extLst>
-              <a:ext uri="{FF2B5EF4-FFF2-40B4-BE49-F238E27FC236}">
-                <a16:creationId xmlns:a16="http://schemas.microsoft.com/office/drawing/2014/main" id="{42F90575-7FF7-4C66-9B6C-8407260BE1F4}"/>
-              </a:ext>
-            </a:extLst>
-          </p:cNvPr>
-          <p:cNvSpPr txBox="1"/>
-          <p:nvPr/>
-        </p:nvSpPr>
-        <p:spPr>
-          <a:xfrm>
-            <a:off x="964734" y="830510"/>
-            <a:ext cx="1954635" cy="523220"/>
-          </a:xfrm>
-          <a:prstGeom prst="rect">
-            <a:avLst/>
-          </a:prstGeom>
-          <a:noFill/>
-        </p:spPr>
-        <p:txBody>
-          <a:bodyPr wrap="square" rtlCol="0">
-            <a:spAutoFit/>
-          </a:bodyPr>
-          <a:lstStyle/>
-          <a:p>
-            <a:r>
-              <a:rPr lang="en-US" sz="2800" b="1" dirty="0"/>
-              <a:t>Overview</a:t>
-            </a:r>
-          </a:p>
-        </p:txBody>
-      </p:sp>
     </p:spTree>
     <p:extLst>
       <p:ext uri="{BB962C8B-B14F-4D97-AF65-F5344CB8AC3E}">
-        <p14:creationId xmlns:p14="http://schemas.microsoft.com/office/powerpoint/2010/main" val="1132971420"/>
+        <p14:creationId xmlns:p14="http://schemas.microsoft.com/office/powerpoint/2010/main" val="626587164"/>
       </p:ext>
     </p:extLst>
   </p:cSld>
@@ -3978,7 +4145,7 @@
 </p:sld>
 </file>
 
-<file path=ppt/slides/slide2.xml><?xml version="1.0" encoding="utf-8"?>
+<file path=ppt/slides/slide3.xml><?xml version="1.0" encoding="utf-8"?>
 <p:sld xmlns:a="http://schemas.openxmlformats.org/drawingml/2006/main" xmlns:r="http://schemas.openxmlformats.org/officeDocument/2006/relationships" xmlns:p="http://schemas.openxmlformats.org/presentationml/2006/main">
   <p:cSld>
     <p:spTree>

</xml_diff>